<commit_message>
added for our example about OOP
</commit_message>
<xml_diff>
--- a/Slide/04- Introduction to Objects in Python.pptx
+++ b/Slide/04- Introduction to Objects in Python.pptx
@@ -5,10 +5,10 @@
     <p:sldMasterId id="2147483714" r:id="rId4"/>
   </p:sldMasterIdLst>
   <p:notesMasterIdLst>
-    <p:notesMasterId r:id="rId43"/>
+    <p:notesMasterId r:id="rId44"/>
   </p:notesMasterIdLst>
   <p:handoutMasterIdLst>
-    <p:handoutMasterId r:id="rId44"/>
+    <p:handoutMasterId r:id="rId45"/>
   </p:handoutMasterIdLst>
   <p:sldIdLst>
     <p:sldId id="263" r:id="rId5"/>
@@ -33,22 +33,23 @@
     <p:sldId id="375" r:id="rId24"/>
     <p:sldId id="372" r:id="rId25"/>
     <p:sldId id="376" r:id="rId26"/>
-    <p:sldId id="377" r:id="rId27"/>
-    <p:sldId id="369" r:id="rId28"/>
-    <p:sldId id="378" r:id="rId29"/>
-    <p:sldId id="379" r:id="rId30"/>
-    <p:sldId id="380" r:id="rId31"/>
-    <p:sldId id="381" r:id="rId32"/>
-    <p:sldId id="382" r:id="rId33"/>
-    <p:sldId id="356" r:id="rId34"/>
-    <p:sldId id="359" r:id="rId35"/>
-    <p:sldId id="361" r:id="rId36"/>
-    <p:sldId id="339" r:id="rId37"/>
-    <p:sldId id="345" r:id="rId38"/>
-    <p:sldId id="337" r:id="rId39"/>
-    <p:sldId id="367" r:id="rId40"/>
-    <p:sldId id="368" r:id="rId41"/>
-    <p:sldId id="269" r:id="rId42"/>
+    <p:sldId id="383" r:id="rId27"/>
+    <p:sldId id="377" r:id="rId28"/>
+    <p:sldId id="369" r:id="rId29"/>
+    <p:sldId id="378" r:id="rId30"/>
+    <p:sldId id="379" r:id="rId31"/>
+    <p:sldId id="380" r:id="rId32"/>
+    <p:sldId id="381" r:id="rId33"/>
+    <p:sldId id="382" r:id="rId34"/>
+    <p:sldId id="356" r:id="rId35"/>
+    <p:sldId id="359" r:id="rId36"/>
+    <p:sldId id="361" r:id="rId37"/>
+    <p:sldId id="339" r:id="rId38"/>
+    <p:sldId id="345" r:id="rId39"/>
+    <p:sldId id="337" r:id="rId40"/>
+    <p:sldId id="367" r:id="rId41"/>
+    <p:sldId id="368" r:id="rId42"/>
+    <p:sldId id="269" r:id="rId43"/>
   </p:sldIdLst>
   <p:sldSz cx="12192000" cy="6858000"/>
   <p:notesSz cx="6858000" cy="9144000"/>
@@ -9278,7 +9279,7 @@
           <a:p>
             <a:fld id="{C051351B-2C5D-457B-ABE5-B64DBC7BD410}" type="slidenum">
               <a:rPr lang="en-US" smtClean="0"/>
-              <a:t>28</a:t>
+              <a:t>29</a:t>
             </a:fld>
             <a:endParaRPr lang="en-US" dirty="0"/>
           </a:p>
@@ -18084,6 +18085,290 @@
           <p:cNvPr id="2" name="Title 1">
             <a:extLst>
               <a:ext uri="{FF2B5EF4-FFF2-40B4-BE49-F238E27FC236}">
+                <a16:creationId xmlns:a16="http://schemas.microsoft.com/office/drawing/2014/main" id="{70E73968-B371-CD85-8BCC-ABF0001A77FB}"/>
+              </a:ext>
+            </a:extLst>
+          </p:cNvPr>
+          <p:cNvSpPr>
+            <a:spLocks noGrp="1"/>
+          </p:cNvSpPr>
+          <p:nvPr>
+            <p:ph type="title"/>
+          </p:nvPr>
+        </p:nvSpPr>
+        <p:spPr>
+          <a:xfrm>
+            <a:off x="1202919" y="284176"/>
+            <a:ext cx="9784080" cy="931166"/>
+          </a:xfrm>
+        </p:spPr>
+        <p:txBody>
+          <a:bodyPr/>
+          <a:lstStyle/>
+          <a:p>
+            <a:endParaRPr lang="en-US"/>
+          </a:p>
+        </p:txBody>
+      </p:sp>
+      <p:sp>
+        <p:nvSpPr>
+          <p:cNvPr id="3" name="Content Placeholder 2">
+            <a:extLst>
+              <a:ext uri="{FF2B5EF4-FFF2-40B4-BE49-F238E27FC236}">
+                <a16:creationId xmlns:a16="http://schemas.microsoft.com/office/drawing/2014/main" id="{80879660-4333-33D4-8BFA-073969D6F78A}"/>
+              </a:ext>
+            </a:extLst>
+          </p:cNvPr>
+          <p:cNvSpPr>
+            <a:spLocks noGrp="1"/>
+          </p:cNvSpPr>
+          <p:nvPr>
+            <p:ph idx="1"/>
+          </p:nvPr>
+        </p:nvSpPr>
+        <p:spPr>
+          <a:xfrm>
+            <a:off x="1202919" y="2011679"/>
+            <a:ext cx="4121435" cy="4944705"/>
+          </a:xfrm>
+        </p:spPr>
+        <p:txBody>
+          <a:bodyPr>
+            <a:normAutofit/>
+          </a:bodyPr>
+          <a:lstStyle/>
+          <a:p>
+            <a:r>
+              <a:rPr lang="fa-IR" dirty="0"/>
+              <a:t>اجاره گیرنده</a:t>
+            </a:r>
+          </a:p>
+          <a:p>
+            <a:r>
+              <a:rPr lang="fa-IR" dirty="0"/>
+              <a:t>اجاره دهنده</a:t>
+            </a:r>
+          </a:p>
+          <a:p>
+            <a:r>
+              <a:rPr lang="fa-IR" dirty="0"/>
+              <a:t>راننده ماشین</a:t>
+            </a:r>
+          </a:p>
+          <a:p>
+            <a:r>
+              <a:rPr lang="fa-IR" dirty="0"/>
+              <a:t>بیمه</a:t>
+            </a:r>
+          </a:p>
+          <a:p>
+            <a:r>
+              <a:rPr lang="fa-IR" dirty="0"/>
+              <a:t>گردش مالی</a:t>
+            </a:r>
+          </a:p>
+          <a:p>
+            <a:r>
+              <a:rPr lang="fa-IR" dirty="0"/>
+              <a:t>سه تا ضامن</a:t>
+            </a:r>
+          </a:p>
+          <a:p>
+            <a:r>
+              <a:rPr lang="fa-IR" dirty="0"/>
+              <a:t>محدوده</a:t>
+            </a:r>
+          </a:p>
+        </p:txBody>
+      </p:sp>
+      <p:sp>
+        <p:nvSpPr>
+          <p:cNvPr id="4" name="Footer Placeholder 3">
+            <a:extLst>
+              <a:ext uri="{FF2B5EF4-FFF2-40B4-BE49-F238E27FC236}">
+                <a16:creationId xmlns:a16="http://schemas.microsoft.com/office/drawing/2014/main" id="{36044E1F-01EA-F1B9-A815-39E10EA27AEA}"/>
+              </a:ext>
+            </a:extLst>
+          </p:cNvPr>
+          <p:cNvSpPr>
+            <a:spLocks noGrp="1"/>
+          </p:cNvSpPr>
+          <p:nvPr>
+            <p:ph type="ftr" sz="quarter" idx="11"/>
+          </p:nvPr>
+        </p:nvSpPr>
+        <p:spPr/>
+        <p:txBody>
+          <a:bodyPr/>
+          <a:lstStyle/>
+          <a:p>
+            <a:r>
+              <a:rPr lang="en-US"/>
+              <a:t>Fundamental Programming with Python</a:t>
+            </a:r>
+            <a:endParaRPr lang="en-US" dirty="0"/>
+          </a:p>
+        </p:txBody>
+      </p:sp>
+      <p:sp>
+        <p:nvSpPr>
+          <p:cNvPr id="5" name="Slide Number Placeholder 4">
+            <a:extLst>
+              <a:ext uri="{FF2B5EF4-FFF2-40B4-BE49-F238E27FC236}">
+                <a16:creationId xmlns:a16="http://schemas.microsoft.com/office/drawing/2014/main" id="{4A865D20-D66A-6D29-8744-B5F9643B098D}"/>
+              </a:ext>
+            </a:extLst>
+          </p:cNvPr>
+          <p:cNvSpPr>
+            <a:spLocks noGrp="1"/>
+          </p:cNvSpPr>
+          <p:nvPr>
+            <p:ph type="sldNum" sz="quarter" idx="12"/>
+          </p:nvPr>
+        </p:nvSpPr>
+        <p:spPr/>
+        <p:txBody>
+          <a:bodyPr/>
+          <a:lstStyle/>
+          <a:p>
+            <a:fld id="{0079CAC6-A72B-4EF8-B465-34FA47827E7F}" type="slidenum">
+              <a:rPr lang="en-US" smtClean="0"/>
+              <a:t>23</a:t>
+            </a:fld>
+            <a:endParaRPr lang="en-US" dirty="0"/>
+          </a:p>
+        </p:txBody>
+      </p:sp>
+      <p:sp>
+        <p:nvSpPr>
+          <p:cNvPr id="6" name="TextBox 5">
+            <a:extLst>
+              <a:ext uri="{FF2B5EF4-FFF2-40B4-BE49-F238E27FC236}">
+                <a16:creationId xmlns:a16="http://schemas.microsoft.com/office/drawing/2014/main" id="{0A482FDA-9AB6-B1D6-064C-59F3939E8B57}"/>
+              </a:ext>
+            </a:extLst>
+          </p:cNvPr>
+          <p:cNvSpPr txBox="1"/>
+          <p:nvPr/>
+        </p:nvSpPr>
+        <p:spPr>
+          <a:xfrm>
+            <a:off x="6516547" y="2037144"/>
+            <a:ext cx="4803494" cy="2862322"/>
+          </a:xfrm>
+          <a:prstGeom prst="rect">
+            <a:avLst/>
+          </a:prstGeom>
+          <a:noFill/>
+        </p:spPr>
+        <p:txBody>
+          <a:bodyPr wrap="square" rtlCol="0">
+            <a:spAutoFit/>
+          </a:bodyPr>
+          <a:lstStyle/>
+          <a:p>
+            <a:r>
+              <a:rPr lang="fa-IR" dirty="0"/>
+              <a:t>گواهینامه</a:t>
+            </a:r>
+          </a:p>
+          <a:p>
+            <a:r>
+              <a:rPr lang="fa-IR" dirty="0"/>
+              <a:t>کارت ملی و مشخصات</a:t>
+            </a:r>
+          </a:p>
+          <a:p>
+            <a:r>
+              <a:rPr lang="fa-IR" dirty="0"/>
+              <a:t>دسته چک</a:t>
+            </a:r>
+          </a:p>
+          <a:p>
+            <a:r>
+              <a:rPr lang="fa-IR" dirty="0"/>
+              <a:t>بررسی </a:t>
+            </a:r>
+            <a:r>
+              <a:rPr lang="fa-IR" dirty="0" err="1"/>
+              <a:t>سوسابقه</a:t>
+            </a:r>
+            <a:endParaRPr lang="fa-IR" dirty="0"/>
+          </a:p>
+          <a:p>
+            <a:r>
+              <a:rPr lang="fa-IR" dirty="0" err="1"/>
+              <a:t>سوسابقه</a:t>
+            </a:r>
+            <a:r>
+              <a:rPr lang="fa-IR" dirty="0"/>
+              <a:t> رانندگی</a:t>
+            </a:r>
+          </a:p>
+          <a:p>
+            <a:r>
+              <a:rPr lang="fa-IR" dirty="0"/>
+              <a:t>فروشگاه دار</a:t>
+            </a:r>
+          </a:p>
+          <a:p>
+            <a:r>
+              <a:rPr lang="fa-IR" dirty="0"/>
+              <a:t>بنزین</a:t>
+            </a:r>
+          </a:p>
+          <a:p>
+            <a:r>
+              <a:rPr lang="fa-IR" dirty="0"/>
+              <a:t>پارکینگ</a:t>
+            </a:r>
+          </a:p>
+          <a:p>
+            <a:r>
+              <a:rPr lang="fa-IR" dirty="0"/>
+              <a:t>ماشین</a:t>
+            </a:r>
+          </a:p>
+          <a:p>
+            <a:endParaRPr lang="en-US" dirty="0"/>
+          </a:p>
+        </p:txBody>
+      </p:sp>
+    </p:spTree>
+    <p:extLst>
+      <p:ext uri="{BB962C8B-B14F-4D97-AF65-F5344CB8AC3E}">
+        <p14:creationId xmlns:p14="http://schemas.microsoft.com/office/powerpoint/2010/main" val="2565439494"/>
+      </p:ext>
+    </p:extLst>
+  </p:cSld>
+  <p:clrMapOvr>
+    <a:masterClrMapping/>
+  </p:clrMapOvr>
+</p:sld>
+</file>
+
+<file path=ppt/slides/slide24.xml><?xml version="1.0" encoding="utf-8"?>
+<p:sld xmlns:a="http://schemas.openxmlformats.org/drawingml/2006/main" xmlns:r="http://schemas.openxmlformats.org/officeDocument/2006/relationships" xmlns:p="http://schemas.openxmlformats.org/presentationml/2006/main">
+  <p:cSld>
+    <p:spTree>
+      <p:nvGrpSpPr>
+        <p:cNvPr id="1" name=""/>
+        <p:cNvGrpSpPr/>
+        <p:nvPr/>
+      </p:nvGrpSpPr>
+      <p:grpSpPr>
+        <a:xfrm>
+          <a:off x="0" y="0"/>
+          <a:ext cx="0" cy="0"/>
+          <a:chOff x="0" y="0"/>
+          <a:chExt cx="0" cy="0"/>
+        </a:xfrm>
+      </p:grpSpPr>
+      <p:sp>
+        <p:nvSpPr>
+          <p:cNvPr id="2" name="Title 1">
+            <a:extLst>
+              <a:ext uri="{FF2B5EF4-FFF2-40B4-BE49-F238E27FC236}">
                 <a16:creationId xmlns:a16="http://schemas.microsoft.com/office/drawing/2014/main" id="{05DAD760-7F0D-7E03-3918-44E91DC01D5B}"/>
               </a:ext>
             </a:extLst>
@@ -18258,7 +18543,7 @@
           <a:p>
             <a:fld id="{0079CAC6-A72B-4EF8-B465-34FA47827E7F}" type="slidenum">
               <a:rPr lang="en-US" smtClean="0"/>
-              <a:t>23</a:t>
+              <a:t>24</a:t>
             </a:fld>
             <a:endParaRPr lang="en-US" dirty="0"/>
           </a:p>
@@ -18997,7 +19282,7 @@
 </p:sld>
 </file>
 
-<file path=ppt/slides/slide24.xml><?xml version="1.0" encoding="utf-8"?>
+<file path=ppt/slides/slide25.xml><?xml version="1.0" encoding="utf-8"?>
 <p:sld xmlns:a="http://schemas.openxmlformats.org/drawingml/2006/main" xmlns:r="http://schemas.openxmlformats.org/officeDocument/2006/relationships" xmlns:p="http://schemas.openxmlformats.org/presentationml/2006/main">
   <p:cSld>
     <p:spTree>
@@ -19065,7 +19350,7 @@
           <a:p>
             <a:fld id="{0079CAC6-A72B-4EF8-B465-34FA47827E7F}" type="slidenum">
               <a:rPr lang="en-US" smtClean="0"/>
-              <a:t>24</a:t>
+              <a:t>25</a:t>
             </a:fld>
             <a:endParaRPr lang="en-US" dirty="0"/>
           </a:p>
@@ -19113,7 +19398,7 @@
 </p:sld>
 </file>
 
-<file path=ppt/slides/slide25.xml><?xml version="1.0" encoding="utf-8"?>
+<file path=ppt/slides/slide26.xml><?xml version="1.0" encoding="utf-8"?>
 <p:sld xmlns:a="http://schemas.openxmlformats.org/drawingml/2006/main" xmlns:r="http://schemas.openxmlformats.org/officeDocument/2006/relationships" xmlns:p="http://schemas.openxmlformats.org/presentationml/2006/main">
   <p:cSld>
     <p:spTree>
@@ -19273,7 +19558,7 @@
           <a:p>
             <a:fld id="{0079CAC6-A72B-4EF8-B465-34FA47827E7F}" type="slidenum">
               <a:rPr lang="en-US" smtClean="0"/>
-              <a:t>25</a:t>
+              <a:t>26</a:t>
             </a:fld>
             <a:endParaRPr lang="en-US" dirty="0"/>
           </a:p>
@@ -19292,7 +19577,7 @@
 </p:sld>
 </file>
 
-<file path=ppt/slides/slide26.xml><?xml version="1.0" encoding="utf-8"?>
+<file path=ppt/slides/slide27.xml><?xml version="1.0" encoding="utf-8"?>
 <p:sld xmlns:a="http://schemas.openxmlformats.org/drawingml/2006/main" xmlns:r="http://schemas.openxmlformats.org/officeDocument/2006/relationships" xmlns:p="http://schemas.openxmlformats.org/presentationml/2006/main">
   <p:cSld>
     <p:spTree>
@@ -19423,7 +19708,7 @@
           <a:p>
             <a:fld id="{0079CAC6-A72B-4EF8-B465-34FA47827E7F}" type="slidenum">
               <a:rPr lang="en-US" smtClean="0"/>
-              <a:t>26</a:t>
+              <a:t>27</a:t>
             </a:fld>
             <a:endParaRPr lang="en-US" dirty="0"/>
           </a:p>
@@ -19442,7 +19727,7 @@
 </p:sld>
 </file>
 
-<file path=ppt/slides/slide27.xml><?xml version="1.0" encoding="utf-8"?>
+<file path=ppt/slides/slide28.xml><?xml version="1.0" encoding="utf-8"?>
 <p:sld xmlns:a="http://schemas.openxmlformats.org/drawingml/2006/main" xmlns:r="http://schemas.openxmlformats.org/officeDocument/2006/relationships" xmlns:p="http://schemas.openxmlformats.org/presentationml/2006/main">
   <p:cSld>
     <p:spTree>
@@ -19539,7 +19824,7 @@
           <a:p>
             <a:fld id="{0079CAC6-A72B-4EF8-B465-34FA47827E7F}" type="slidenum">
               <a:rPr lang="en-US" smtClean="0"/>
-              <a:t>27</a:t>
+              <a:t>28</a:t>
             </a:fld>
             <a:endParaRPr lang="en-US" dirty="0"/>
           </a:p>
@@ -19607,7 +19892,7 @@
 </p:sld>
 </file>
 
-<file path=ppt/slides/slide28.xml><?xml version="1.0" encoding="utf-8"?>
+<file path=ppt/slides/slide29.xml><?xml version="1.0" encoding="utf-8"?>
 <p:sld xmlns:a="http://schemas.openxmlformats.org/drawingml/2006/main" xmlns:r="http://schemas.openxmlformats.org/officeDocument/2006/relationships" xmlns:p="http://schemas.openxmlformats.org/presentationml/2006/main">
   <p:cSld>
     <p:spTree>
@@ -19746,7 +20031,7 @@
           <a:p>
             <a:fld id="{0079CAC6-A72B-4EF8-B465-34FA47827E7F}" type="slidenum">
               <a:rPr lang="en-US" smtClean="0"/>
-              <a:t>28</a:t>
+              <a:t>29</a:t>
             </a:fld>
             <a:endParaRPr lang="en-US" dirty="0"/>
           </a:p>
@@ -19762,804 +20047,6 @@
   <p:clrMapOvr>
     <a:masterClrMapping/>
   </p:clrMapOvr>
-</p:sld>
-</file>
-
-<file path=ppt/slides/slide29.xml><?xml version="1.0" encoding="utf-8"?>
-<p:sld xmlns:a="http://schemas.openxmlformats.org/drawingml/2006/main" xmlns:r="http://schemas.openxmlformats.org/officeDocument/2006/relationships" xmlns:p="http://schemas.openxmlformats.org/presentationml/2006/main">
-  <p:cSld>
-    <p:spTree>
-      <p:nvGrpSpPr>
-        <p:cNvPr id="1" name=""/>
-        <p:cNvGrpSpPr/>
-        <p:nvPr/>
-      </p:nvGrpSpPr>
-      <p:grpSpPr>
-        <a:xfrm>
-          <a:off x="0" y="0"/>
-          <a:ext cx="0" cy="0"/>
-          <a:chOff x="0" y="0"/>
-          <a:chExt cx="0" cy="0"/>
-        </a:xfrm>
-      </p:grpSpPr>
-      <p:sp>
-        <p:nvSpPr>
-          <p:cNvPr id="2" name="Title 1">
-            <a:extLst>
-              <a:ext uri="{FF2B5EF4-FFF2-40B4-BE49-F238E27FC236}">
-                <a16:creationId xmlns:a16="http://schemas.microsoft.com/office/drawing/2014/main" id="{91A594EF-537E-20FA-3F16-6FADDBA14EE9}"/>
-              </a:ext>
-            </a:extLst>
-          </p:cNvPr>
-          <p:cNvSpPr>
-            <a:spLocks noGrp="1"/>
-          </p:cNvSpPr>
-          <p:nvPr>
-            <p:ph type="title"/>
-          </p:nvPr>
-        </p:nvSpPr>
-        <p:spPr/>
-        <p:txBody>
-          <a:bodyPr/>
-          <a:lstStyle/>
-          <a:p>
-            <a:r>
-              <a:rPr lang="en-US" dirty="0"/>
-              <a:t>We have different types of statement!</a:t>
-            </a:r>
-          </a:p>
-        </p:txBody>
-      </p:sp>
-      <p:sp>
-        <p:nvSpPr>
-          <p:cNvPr id="4" name="Footer Placeholder 3">
-            <a:extLst>
-              <a:ext uri="{FF2B5EF4-FFF2-40B4-BE49-F238E27FC236}">
-                <a16:creationId xmlns:a16="http://schemas.microsoft.com/office/drawing/2014/main" id="{D6695B61-6335-0A0B-32B7-FB53D6EC8893}"/>
-              </a:ext>
-            </a:extLst>
-          </p:cNvPr>
-          <p:cNvSpPr>
-            <a:spLocks noGrp="1"/>
-          </p:cNvSpPr>
-          <p:nvPr>
-            <p:ph type="ftr" sz="quarter" idx="11"/>
-          </p:nvPr>
-        </p:nvSpPr>
-        <p:spPr/>
-        <p:txBody>
-          <a:bodyPr/>
-          <a:lstStyle/>
-          <a:p>
-            <a:r>
-              <a:rPr lang="en-US"/>
-              <a:t>Fundamental Programming with Python</a:t>
-            </a:r>
-            <a:endParaRPr lang="en-US" dirty="0"/>
-          </a:p>
-        </p:txBody>
-      </p:sp>
-      <p:sp>
-        <p:nvSpPr>
-          <p:cNvPr id="5" name="Slide Number Placeholder 4">
-            <a:extLst>
-              <a:ext uri="{FF2B5EF4-FFF2-40B4-BE49-F238E27FC236}">
-                <a16:creationId xmlns:a16="http://schemas.microsoft.com/office/drawing/2014/main" id="{853F8ADF-A8E7-7B7F-E0E4-25F972DC2837}"/>
-              </a:ext>
-            </a:extLst>
-          </p:cNvPr>
-          <p:cNvSpPr>
-            <a:spLocks noGrp="1"/>
-          </p:cNvSpPr>
-          <p:nvPr>
-            <p:ph type="sldNum" sz="quarter" idx="12"/>
-          </p:nvPr>
-        </p:nvSpPr>
-        <p:spPr/>
-        <p:txBody>
-          <a:bodyPr/>
-          <a:lstStyle/>
-          <a:p>
-            <a:fld id="{0079CAC6-A72B-4EF8-B465-34FA47827E7F}" type="slidenum">
-              <a:rPr lang="en-US" smtClean="0"/>
-              <a:t>29</a:t>
-            </a:fld>
-            <a:endParaRPr lang="en-US" dirty="0"/>
-          </a:p>
-        </p:txBody>
-      </p:sp>
-      <p:pic>
-        <p:nvPicPr>
-          <p:cNvPr id="9" name="Content Placeholder 8">
-            <a:extLst>
-              <a:ext uri="{FF2B5EF4-FFF2-40B4-BE49-F238E27FC236}">
-                <a16:creationId xmlns:a16="http://schemas.microsoft.com/office/drawing/2014/main" id="{45310F2C-0B27-510E-9E9D-173C93035CA4}"/>
-              </a:ext>
-            </a:extLst>
-          </p:cNvPr>
-          <p:cNvPicPr>
-            <a:picLocks noGrp="1" noChangeAspect="1"/>
-          </p:cNvPicPr>
-          <p:nvPr>
-            <p:ph idx="1"/>
-          </p:nvPr>
-        </p:nvPicPr>
-        <p:blipFill>
-          <a:blip r:embed="rId2"/>
-          <a:stretch>
-            <a:fillRect/>
-          </a:stretch>
-        </p:blipFill>
-        <p:spPr bwMode="auto">
-          <a:xfrm>
-            <a:off x="7801232" y="2011680"/>
-            <a:ext cx="2977173" cy="4206875"/>
-          </a:xfrm>
-          <a:prstGeom prst="rect">
-            <a:avLst/>
-          </a:prstGeom>
-          <a:noFill/>
-          <a:extLst>
-            <a:ext uri="{909E8E84-426E-40DD-AFC4-6F175D3DCCD1}">
-              <a14:hiddenFill xmlns:a14="http://schemas.microsoft.com/office/drawing/2010/main">
-                <a:solidFill>
-                  <a:srgbClr val="FFFFFF"/>
-                </a:solidFill>
-              </a14:hiddenFill>
-            </a:ext>
-          </a:extLst>
-        </p:spPr>
-      </p:pic>
-      <p:sp>
-        <p:nvSpPr>
-          <p:cNvPr id="10" name="Content Placeholder 2">
-            <a:extLst>
-              <a:ext uri="{FF2B5EF4-FFF2-40B4-BE49-F238E27FC236}">
-                <a16:creationId xmlns:a16="http://schemas.microsoft.com/office/drawing/2014/main" id="{A4DAA886-CF13-F24E-BC1D-8C9B12FBF111}"/>
-              </a:ext>
-            </a:extLst>
-          </p:cNvPr>
-          <p:cNvSpPr txBox="1">
-            <a:spLocks/>
-          </p:cNvSpPr>
-          <p:nvPr/>
-        </p:nvSpPr>
-        <p:spPr>
-          <a:xfrm>
-            <a:off x="1202919" y="2011680"/>
-            <a:ext cx="9784080" cy="4206240"/>
-          </a:xfrm>
-          <a:prstGeom prst="rect">
-            <a:avLst/>
-          </a:prstGeom>
-        </p:spPr>
-        <p:txBody>
-          <a:bodyPr vert="horz" lIns="91440" tIns="45720" rIns="91440" bIns="45720" rtlCol="0">
-            <a:normAutofit/>
-          </a:bodyPr>
-          <a:lstStyle>
-            <a:lvl1pPr marL="182880" indent="-182880" algn="l" defTabSz="914400" rtl="0" eaLnBrk="1" latinLnBrk="0" hangingPunct="1">
-              <a:lnSpc>
-                <a:spcPct val="90000"/>
-              </a:lnSpc>
-              <a:spcBef>
-                <a:spcPts val="1200"/>
-              </a:spcBef>
-              <a:spcAft>
-                <a:spcPts val="200"/>
-              </a:spcAft>
-              <a:buClr>
-                <a:schemeClr val="tx1"/>
-              </a:buClr>
-              <a:buFont typeface="Wingdings" pitchFamily="2" charset="2"/>
-              <a:buChar char=""/>
-              <a:defRPr sz="3200" kern="1200">
-                <a:solidFill>
-                  <a:schemeClr val="tx1"/>
-                </a:solidFill>
-                <a:latin typeface="+mn-lt"/>
-                <a:ea typeface="+mn-ea"/>
-                <a:cs typeface="+mn-cs"/>
-              </a:defRPr>
-            </a:lvl1pPr>
-            <a:lvl2pPr marL="411480" indent="-182880" algn="l" defTabSz="914400" rtl="0" eaLnBrk="1" latinLnBrk="0" hangingPunct="1">
-              <a:lnSpc>
-                <a:spcPct val="90000"/>
-              </a:lnSpc>
-              <a:spcBef>
-                <a:spcPts val="200"/>
-              </a:spcBef>
-              <a:spcAft>
-                <a:spcPts val="400"/>
-              </a:spcAft>
-              <a:buClr>
-                <a:schemeClr val="tx1"/>
-              </a:buClr>
-              <a:buFont typeface="Wingdings" pitchFamily="2" charset="2"/>
-              <a:buChar char=""/>
-              <a:defRPr sz="3200" kern="1200">
-                <a:solidFill>
-                  <a:schemeClr val="tx1"/>
-                </a:solidFill>
-                <a:latin typeface="+mn-lt"/>
-                <a:ea typeface="+mn-ea"/>
-                <a:cs typeface="+mn-cs"/>
-              </a:defRPr>
-            </a:lvl2pPr>
-            <a:lvl3pPr marL="640080" indent="-182880" algn="l" defTabSz="914400" rtl="0" eaLnBrk="1" latinLnBrk="0" hangingPunct="1">
-              <a:lnSpc>
-                <a:spcPct val="90000"/>
-              </a:lnSpc>
-              <a:spcBef>
-                <a:spcPts val="200"/>
-              </a:spcBef>
-              <a:spcAft>
-                <a:spcPts val="400"/>
-              </a:spcAft>
-              <a:buClr>
-                <a:schemeClr val="tx1"/>
-              </a:buClr>
-              <a:buFont typeface="Wingdings" pitchFamily="2" charset="2"/>
-              <a:buChar char=""/>
-              <a:defRPr sz="2800" kern="1200">
-                <a:solidFill>
-                  <a:schemeClr val="tx1"/>
-                </a:solidFill>
-                <a:latin typeface="+mn-lt"/>
-                <a:ea typeface="+mn-ea"/>
-                <a:cs typeface="+mn-cs"/>
-              </a:defRPr>
-            </a:lvl3pPr>
-            <a:lvl4pPr marL="868680" indent="-182880" algn="l" defTabSz="914400" rtl="0" eaLnBrk="1" latinLnBrk="0" hangingPunct="1">
-              <a:lnSpc>
-                <a:spcPct val="90000"/>
-              </a:lnSpc>
-              <a:spcBef>
-                <a:spcPts val="200"/>
-              </a:spcBef>
-              <a:spcAft>
-                <a:spcPts val="400"/>
-              </a:spcAft>
-              <a:buClr>
-                <a:schemeClr val="tx1"/>
-              </a:buClr>
-              <a:buFont typeface="Wingdings" pitchFamily="2" charset="2"/>
-              <a:buChar char=""/>
-              <a:defRPr sz="2400" kern="1200">
-                <a:solidFill>
-                  <a:schemeClr val="tx1"/>
-                </a:solidFill>
-                <a:latin typeface="+mn-lt"/>
-                <a:ea typeface="+mn-ea"/>
-                <a:cs typeface="+mn-cs"/>
-              </a:defRPr>
-            </a:lvl4pPr>
-            <a:lvl5pPr marL="1097280" indent="-182880" algn="l" defTabSz="914400" rtl="0" eaLnBrk="1" latinLnBrk="0" hangingPunct="1">
-              <a:lnSpc>
-                <a:spcPct val="90000"/>
-              </a:lnSpc>
-              <a:spcBef>
-                <a:spcPts val="200"/>
-              </a:spcBef>
-              <a:spcAft>
-                <a:spcPts val="400"/>
-              </a:spcAft>
-              <a:buClr>
-                <a:schemeClr val="tx1"/>
-              </a:buClr>
-              <a:buFont typeface="Wingdings" pitchFamily="2" charset="2"/>
-              <a:buChar char=""/>
-              <a:defRPr sz="2400" kern="1200">
-                <a:solidFill>
-                  <a:schemeClr val="tx1"/>
-                </a:solidFill>
-                <a:latin typeface="+mn-lt"/>
-                <a:ea typeface="+mn-ea"/>
-                <a:cs typeface="+mn-cs"/>
-              </a:defRPr>
-            </a:lvl5pPr>
-            <a:lvl6pPr marL="1284600" indent="-228600" algn="l" defTabSz="914400" rtl="0" eaLnBrk="1" latinLnBrk="0" hangingPunct="1">
-              <a:lnSpc>
-                <a:spcPct val="90000"/>
-              </a:lnSpc>
-              <a:spcBef>
-                <a:spcPts val="200"/>
-              </a:spcBef>
-              <a:spcAft>
-                <a:spcPts val="400"/>
-              </a:spcAft>
-              <a:buClr>
-                <a:schemeClr val="tx1"/>
-              </a:buClr>
-              <a:buFont typeface="Wingdings" pitchFamily="2" charset="2"/>
-              <a:buChar char=""/>
-              <a:defRPr sz="1600" kern="1200">
-                <a:solidFill>
-                  <a:schemeClr val="tx1"/>
-                </a:solidFill>
-                <a:latin typeface="+mn-lt"/>
-                <a:ea typeface="+mn-ea"/>
-                <a:cs typeface="+mn-cs"/>
-              </a:defRPr>
-            </a:lvl6pPr>
-            <a:lvl7pPr marL="1471800" indent="-228600" algn="l" defTabSz="914400" rtl="0" eaLnBrk="1" latinLnBrk="0" hangingPunct="1">
-              <a:lnSpc>
-                <a:spcPct val="90000"/>
-              </a:lnSpc>
-              <a:spcBef>
-                <a:spcPts val="200"/>
-              </a:spcBef>
-              <a:spcAft>
-                <a:spcPts val="400"/>
-              </a:spcAft>
-              <a:buClr>
-                <a:schemeClr val="tx1"/>
-              </a:buClr>
-              <a:buFont typeface="Wingdings" pitchFamily="2" charset="2"/>
-              <a:buChar char=""/>
-              <a:defRPr sz="1600" kern="1200">
-                <a:solidFill>
-                  <a:schemeClr val="tx1"/>
-                </a:solidFill>
-                <a:latin typeface="+mn-lt"/>
-                <a:ea typeface="+mn-ea"/>
-                <a:cs typeface="+mn-cs"/>
-              </a:defRPr>
-            </a:lvl7pPr>
-            <a:lvl8pPr marL="1629000" indent="-228600" algn="l" defTabSz="914400" rtl="0" eaLnBrk="1" latinLnBrk="0" hangingPunct="1">
-              <a:lnSpc>
-                <a:spcPct val="90000"/>
-              </a:lnSpc>
-              <a:spcBef>
-                <a:spcPts val="200"/>
-              </a:spcBef>
-              <a:spcAft>
-                <a:spcPts val="400"/>
-              </a:spcAft>
-              <a:buClr>
-                <a:schemeClr val="tx1"/>
-              </a:buClr>
-              <a:buFont typeface="Wingdings" pitchFamily="2" charset="2"/>
-              <a:buChar char=""/>
-              <a:defRPr sz="1600" kern="1200">
-                <a:solidFill>
-                  <a:schemeClr val="tx1"/>
-                </a:solidFill>
-                <a:latin typeface="+mn-lt"/>
-                <a:ea typeface="+mn-ea"/>
-                <a:cs typeface="+mn-cs"/>
-              </a:defRPr>
-            </a:lvl8pPr>
-            <a:lvl9pPr marL="1806200" indent="-228600" algn="l" defTabSz="914400" rtl="0" eaLnBrk="1" latinLnBrk="0" hangingPunct="1">
-              <a:lnSpc>
-                <a:spcPct val="90000"/>
-              </a:lnSpc>
-              <a:spcBef>
-                <a:spcPts val="200"/>
-              </a:spcBef>
-              <a:spcAft>
-                <a:spcPts val="400"/>
-              </a:spcAft>
-              <a:buClr>
-                <a:schemeClr val="tx1"/>
-              </a:buClr>
-              <a:buFont typeface="Wingdings" pitchFamily="2" charset="2"/>
-              <a:buChar char=""/>
-              <a:defRPr sz="1600" kern="1200">
-                <a:solidFill>
-                  <a:schemeClr val="tx1"/>
-                </a:solidFill>
-                <a:latin typeface="+mn-lt"/>
-                <a:ea typeface="+mn-ea"/>
-                <a:cs typeface="+mn-cs"/>
-              </a:defRPr>
-            </a:lvl9pPr>
-          </a:lstStyle>
-          <a:p>
-            <a:r>
-              <a:rPr lang="en-US" dirty="0"/>
-              <a:t>Simple statement (+)</a:t>
-            </a:r>
-          </a:p>
-          <a:p>
-            <a:r>
-              <a:rPr lang="en-US" dirty="0"/>
-              <a:t>Loop statement (while)</a:t>
-            </a:r>
-          </a:p>
-          <a:p>
-            <a:r>
-              <a:rPr lang="en-US" dirty="0"/>
-              <a:t>Control statement (if)</a:t>
-            </a:r>
-          </a:p>
-        </p:txBody>
-      </p:sp>
-    </p:spTree>
-    <p:extLst>
-      <p:ext uri="{BB962C8B-B14F-4D97-AF65-F5344CB8AC3E}">
-        <p14:creationId xmlns:p14="http://schemas.microsoft.com/office/powerpoint/2010/main" val="1995445071"/>
-      </p:ext>
-    </p:extLst>
-  </p:cSld>
-  <p:clrMapOvr>
-    <a:masterClrMapping/>
-  </p:clrMapOvr>
-  <p:timing>
-    <p:tnLst>
-      <p:par>
-        <p:cTn id="1" dur="indefinite" restart="never" nodeType="tmRoot">
-          <p:childTnLst>
-            <p:seq concurrent="1" nextAc="seek">
-              <p:cTn id="2" dur="indefinite" nodeType="mainSeq">
-                <p:childTnLst>
-                  <p:par>
-                    <p:cTn id="3" fill="hold">
-                      <p:stCondLst>
-                        <p:cond delay="indefinite"/>
-                      </p:stCondLst>
-                      <p:childTnLst>
-                        <p:par>
-                          <p:cTn id="4" fill="hold">
-                            <p:stCondLst>
-                              <p:cond delay="0"/>
-                            </p:stCondLst>
-                            <p:childTnLst>
-                              <p:par>
-                                <p:cTn id="5" presetID="42" presetClass="entr" presetSubtype="0" fill="hold" nodeType="clickEffect">
-                                  <p:stCondLst>
-                                    <p:cond delay="0"/>
-                                  </p:stCondLst>
-                                  <p:childTnLst>
-                                    <p:set>
-                                      <p:cBhvr>
-                                        <p:cTn id="6" dur="1" fill="hold">
-                                          <p:stCondLst>
-                                            <p:cond delay="0"/>
-                                          </p:stCondLst>
-                                        </p:cTn>
-                                        <p:tgtEl>
-                                          <p:spTgt spid="10">
-                                            <p:txEl>
-                                              <p:pRg st="0" end="0"/>
-                                            </p:txEl>
-                                          </p:spTgt>
-                                        </p:tgtEl>
-                                        <p:attrNameLst>
-                                          <p:attrName>style.visibility</p:attrName>
-                                        </p:attrNameLst>
-                                      </p:cBhvr>
-                                      <p:to>
-                                        <p:strVal val="visible"/>
-                                      </p:to>
-                                    </p:set>
-                                    <p:animEffect transition="in" filter="fade">
-                                      <p:cBhvr>
-                                        <p:cTn id="7" dur="1000"/>
-                                        <p:tgtEl>
-                                          <p:spTgt spid="10">
-                                            <p:txEl>
-                                              <p:pRg st="0" end="0"/>
-                                            </p:txEl>
-                                          </p:spTgt>
-                                        </p:tgtEl>
-                                      </p:cBhvr>
-                                    </p:animEffect>
-                                    <p:anim calcmode="lin" valueType="num">
-                                      <p:cBhvr>
-                                        <p:cTn id="8" dur="1000" fill="hold"/>
-                                        <p:tgtEl>
-                                          <p:spTgt spid="10">
-                                            <p:txEl>
-                                              <p:pRg st="0" end="0"/>
-                                            </p:txEl>
-                                          </p:spTgt>
-                                        </p:tgtEl>
-                                        <p:attrNameLst>
-                                          <p:attrName>ppt_x</p:attrName>
-                                        </p:attrNameLst>
-                                      </p:cBhvr>
-                                      <p:tavLst>
-                                        <p:tav tm="0">
-                                          <p:val>
-                                            <p:strVal val="#ppt_x"/>
-                                          </p:val>
-                                        </p:tav>
-                                        <p:tav tm="100000">
-                                          <p:val>
-                                            <p:strVal val="#ppt_x"/>
-                                          </p:val>
-                                        </p:tav>
-                                      </p:tavLst>
-                                    </p:anim>
-                                    <p:anim calcmode="lin" valueType="num">
-                                      <p:cBhvr>
-                                        <p:cTn id="9" dur="1000" fill="hold"/>
-                                        <p:tgtEl>
-                                          <p:spTgt spid="10">
-                                            <p:txEl>
-                                              <p:pRg st="0" end="0"/>
-                                            </p:txEl>
-                                          </p:spTgt>
-                                        </p:tgtEl>
-                                        <p:attrNameLst>
-                                          <p:attrName>ppt_y</p:attrName>
-                                        </p:attrNameLst>
-                                      </p:cBhvr>
-                                      <p:tavLst>
-                                        <p:tav tm="0">
-                                          <p:val>
-                                            <p:strVal val="#ppt_y+.1"/>
-                                          </p:val>
-                                        </p:tav>
-                                        <p:tav tm="100000">
-                                          <p:val>
-                                            <p:strVal val="#ppt_y"/>
-                                          </p:val>
-                                        </p:tav>
-                                      </p:tavLst>
-                                    </p:anim>
-                                  </p:childTnLst>
-                                </p:cTn>
-                              </p:par>
-                            </p:childTnLst>
-                          </p:cTn>
-                        </p:par>
-                      </p:childTnLst>
-                    </p:cTn>
-                  </p:par>
-                  <p:par>
-                    <p:cTn id="10" fill="hold">
-                      <p:stCondLst>
-                        <p:cond delay="indefinite"/>
-                      </p:stCondLst>
-                      <p:childTnLst>
-                        <p:par>
-                          <p:cTn id="11" fill="hold">
-                            <p:stCondLst>
-                              <p:cond delay="0"/>
-                            </p:stCondLst>
-                            <p:childTnLst>
-                              <p:par>
-                                <p:cTn id="12" presetID="42" presetClass="entr" presetSubtype="0" fill="hold" nodeType="clickEffect">
-                                  <p:stCondLst>
-                                    <p:cond delay="0"/>
-                                  </p:stCondLst>
-                                  <p:childTnLst>
-                                    <p:set>
-                                      <p:cBhvr>
-                                        <p:cTn id="13" dur="1" fill="hold">
-                                          <p:stCondLst>
-                                            <p:cond delay="0"/>
-                                          </p:stCondLst>
-                                        </p:cTn>
-                                        <p:tgtEl>
-                                          <p:spTgt spid="10">
-                                            <p:txEl>
-                                              <p:pRg st="1" end="1"/>
-                                            </p:txEl>
-                                          </p:spTgt>
-                                        </p:tgtEl>
-                                        <p:attrNameLst>
-                                          <p:attrName>style.visibility</p:attrName>
-                                        </p:attrNameLst>
-                                      </p:cBhvr>
-                                      <p:to>
-                                        <p:strVal val="visible"/>
-                                      </p:to>
-                                    </p:set>
-                                    <p:animEffect transition="in" filter="fade">
-                                      <p:cBhvr>
-                                        <p:cTn id="14" dur="1000"/>
-                                        <p:tgtEl>
-                                          <p:spTgt spid="10">
-                                            <p:txEl>
-                                              <p:pRg st="1" end="1"/>
-                                            </p:txEl>
-                                          </p:spTgt>
-                                        </p:tgtEl>
-                                      </p:cBhvr>
-                                    </p:animEffect>
-                                    <p:anim calcmode="lin" valueType="num">
-                                      <p:cBhvr>
-                                        <p:cTn id="15" dur="1000" fill="hold"/>
-                                        <p:tgtEl>
-                                          <p:spTgt spid="10">
-                                            <p:txEl>
-                                              <p:pRg st="1" end="1"/>
-                                            </p:txEl>
-                                          </p:spTgt>
-                                        </p:tgtEl>
-                                        <p:attrNameLst>
-                                          <p:attrName>ppt_x</p:attrName>
-                                        </p:attrNameLst>
-                                      </p:cBhvr>
-                                      <p:tavLst>
-                                        <p:tav tm="0">
-                                          <p:val>
-                                            <p:strVal val="#ppt_x"/>
-                                          </p:val>
-                                        </p:tav>
-                                        <p:tav tm="100000">
-                                          <p:val>
-                                            <p:strVal val="#ppt_x"/>
-                                          </p:val>
-                                        </p:tav>
-                                      </p:tavLst>
-                                    </p:anim>
-                                    <p:anim calcmode="lin" valueType="num">
-                                      <p:cBhvr>
-                                        <p:cTn id="16" dur="1000" fill="hold"/>
-                                        <p:tgtEl>
-                                          <p:spTgt spid="10">
-                                            <p:txEl>
-                                              <p:pRg st="1" end="1"/>
-                                            </p:txEl>
-                                          </p:spTgt>
-                                        </p:tgtEl>
-                                        <p:attrNameLst>
-                                          <p:attrName>ppt_y</p:attrName>
-                                        </p:attrNameLst>
-                                      </p:cBhvr>
-                                      <p:tavLst>
-                                        <p:tav tm="0">
-                                          <p:val>
-                                            <p:strVal val="#ppt_y+.1"/>
-                                          </p:val>
-                                        </p:tav>
-                                        <p:tav tm="100000">
-                                          <p:val>
-                                            <p:strVal val="#ppt_y"/>
-                                          </p:val>
-                                        </p:tav>
-                                      </p:tavLst>
-                                    </p:anim>
-                                  </p:childTnLst>
-                                </p:cTn>
-                              </p:par>
-                            </p:childTnLst>
-                          </p:cTn>
-                        </p:par>
-                      </p:childTnLst>
-                    </p:cTn>
-                  </p:par>
-                  <p:par>
-                    <p:cTn id="17" fill="hold">
-                      <p:stCondLst>
-                        <p:cond delay="indefinite"/>
-                      </p:stCondLst>
-                      <p:childTnLst>
-                        <p:par>
-                          <p:cTn id="18" fill="hold">
-                            <p:stCondLst>
-                              <p:cond delay="0"/>
-                            </p:stCondLst>
-                            <p:childTnLst>
-                              <p:par>
-                                <p:cTn id="19" presetID="42" presetClass="entr" presetSubtype="0" fill="hold" nodeType="clickEffect">
-                                  <p:stCondLst>
-                                    <p:cond delay="0"/>
-                                  </p:stCondLst>
-                                  <p:childTnLst>
-                                    <p:set>
-                                      <p:cBhvr>
-                                        <p:cTn id="20" dur="1" fill="hold">
-                                          <p:stCondLst>
-                                            <p:cond delay="0"/>
-                                          </p:stCondLst>
-                                        </p:cTn>
-                                        <p:tgtEl>
-                                          <p:spTgt spid="10">
-                                            <p:txEl>
-                                              <p:pRg st="2" end="2"/>
-                                            </p:txEl>
-                                          </p:spTgt>
-                                        </p:tgtEl>
-                                        <p:attrNameLst>
-                                          <p:attrName>style.visibility</p:attrName>
-                                        </p:attrNameLst>
-                                      </p:cBhvr>
-                                      <p:to>
-                                        <p:strVal val="visible"/>
-                                      </p:to>
-                                    </p:set>
-                                    <p:animEffect transition="in" filter="fade">
-                                      <p:cBhvr>
-                                        <p:cTn id="21" dur="1000"/>
-                                        <p:tgtEl>
-                                          <p:spTgt spid="10">
-                                            <p:txEl>
-                                              <p:pRg st="2" end="2"/>
-                                            </p:txEl>
-                                          </p:spTgt>
-                                        </p:tgtEl>
-                                      </p:cBhvr>
-                                    </p:animEffect>
-                                    <p:anim calcmode="lin" valueType="num">
-                                      <p:cBhvr>
-                                        <p:cTn id="22" dur="1000" fill="hold"/>
-                                        <p:tgtEl>
-                                          <p:spTgt spid="10">
-                                            <p:txEl>
-                                              <p:pRg st="2" end="2"/>
-                                            </p:txEl>
-                                          </p:spTgt>
-                                        </p:tgtEl>
-                                        <p:attrNameLst>
-                                          <p:attrName>ppt_x</p:attrName>
-                                        </p:attrNameLst>
-                                      </p:cBhvr>
-                                      <p:tavLst>
-                                        <p:tav tm="0">
-                                          <p:val>
-                                            <p:strVal val="#ppt_x"/>
-                                          </p:val>
-                                        </p:tav>
-                                        <p:tav tm="100000">
-                                          <p:val>
-                                            <p:strVal val="#ppt_x"/>
-                                          </p:val>
-                                        </p:tav>
-                                      </p:tavLst>
-                                    </p:anim>
-                                    <p:anim calcmode="lin" valueType="num">
-                                      <p:cBhvr>
-                                        <p:cTn id="23" dur="1000" fill="hold"/>
-                                        <p:tgtEl>
-                                          <p:spTgt spid="10">
-                                            <p:txEl>
-                                              <p:pRg st="2" end="2"/>
-                                            </p:txEl>
-                                          </p:spTgt>
-                                        </p:tgtEl>
-                                        <p:attrNameLst>
-                                          <p:attrName>ppt_y</p:attrName>
-                                        </p:attrNameLst>
-                                      </p:cBhvr>
-                                      <p:tavLst>
-                                        <p:tav tm="0">
-                                          <p:val>
-                                            <p:strVal val="#ppt_y+.1"/>
-                                          </p:val>
-                                        </p:tav>
-                                        <p:tav tm="100000">
-                                          <p:val>
-                                            <p:strVal val="#ppt_y"/>
-                                          </p:val>
-                                        </p:tav>
-                                      </p:tavLst>
-                                    </p:anim>
-                                  </p:childTnLst>
-                                </p:cTn>
-                              </p:par>
-                            </p:childTnLst>
-                          </p:cTn>
-                        </p:par>
-                      </p:childTnLst>
-                    </p:cTn>
-                  </p:par>
-                </p:childTnLst>
-              </p:cTn>
-              <p:prevCondLst>
-                <p:cond evt="onPrev" delay="0">
-                  <p:tgtEl>
-                    <p:sldTgt/>
-                  </p:tgtEl>
-                </p:cond>
-              </p:prevCondLst>
-              <p:nextCondLst>
-                <p:cond evt="onNext" delay="0">
-                  <p:tgtEl>
-                    <p:sldTgt/>
-                  </p:tgtEl>
-                </p:cond>
-              </p:nextCondLst>
-            </p:seq>
-          </p:childTnLst>
-        </p:cTn>
-      </p:par>
-    </p:tnLst>
-  </p:timing>
 </p:sld>
 </file>
 
@@ -21487,6 +20974,804 @@
       </p:grpSpPr>
       <p:sp>
         <p:nvSpPr>
+          <p:cNvPr id="2" name="Title 1">
+            <a:extLst>
+              <a:ext uri="{FF2B5EF4-FFF2-40B4-BE49-F238E27FC236}">
+                <a16:creationId xmlns:a16="http://schemas.microsoft.com/office/drawing/2014/main" id="{91A594EF-537E-20FA-3F16-6FADDBA14EE9}"/>
+              </a:ext>
+            </a:extLst>
+          </p:cNvPr>
+          <p:cNvSpPr>
+            <a:spLocks noGrp="1"/>
+          </p:cNvSpPr>
+          <p:nvPr>
+            <p:ph type="title"/>
+          </p:nvPr>
+        </p:nvSpPr>
+        <p:spPr/>
+        <p:txBody>
+          <a:bodyPr/>
+          <a:lstStyle/>
+          <a:p>
+            <a:r>
+              <a:rPr lang="en-US" dirty="0"/>
+              <a:t>We have different types of statement!</a:t>
+            </a:r>
+          </a:p>
+        </p:txBody>
+      </p:sp>
+      <p:sp>
+        <p:nvSpPr>
+          <p:cNvPr id="4" name="Footer Placeholder 3">
+            <a:extLst>
+              <a:ext uri="{FF2B5EF4-FFF2-40B4-BE49-F238E27FC236}">
+                <a16:creationId xmlns:a16="http://schemas.microsoft.com/office/drawing/2014/main" id="{D6695B61-6335-0A0B-32B7-FB53D6EC8893}"/>
+              </a:ext>
+            </a:extLst>
+          </p:cNvPr>
+          <p:cNvSpPr>
+            <a:spLocks noGrp="1"/>
+          </p:cNvSpPr>
+          <p:nvPr>
+            <p:ph type="ftr" sz="quarter" idx="11"/>
+          </p:nvPr>
+        </p:nvSpPr>
+        <p:spPr/>
+        <p:txBody>
+          <a:bodyPr/>
+          <a:lstStyle/>
+          <a:p>
+            <a:r>
+              <a:rPr lang="en-US"/>
+              <a:t>Fundamental Programming with Python</a:t>
+            </a:r>
+            <a:endParaRPr lang="en-US" dirty="0"/>
+          </a:p>
+        </p:txBody>
+      </p:sp>
+      <p:sp>
+        <p:nvSpPr>
+          <p:cNvPr id="5" name="Slide Number Placeholder 4">
+            <a:extLst>
+              <a:ext uri="{FF2B5EF4-FFF2-40B4-BE49-F238E27FC236}">
+                <a16:creationId xmlns:a16="http://schemas.microsoft.com/office/drawing/2014/main" id="{853F8ADF-A8E7-7B7F-E0E4-25F972DC2837}"/>
+              </a:ext>
+            </a:extLst>
+          </p:cNvPr>
+          <p:cNvSpPr>
+            <a:spLocks noGrp="1"/>
+          </p:cNvSpPr>
+          <p:nvPr>
+            <p:ph type="sldNum" sz="quarter" idx="12"/>
+          </p:nvPr>
+        </p:nvSpPr>
+        <p:spPr/>
+        <p:txBody>
+          <a:bodyPr/>
+          <a:lstStyle/>
+          <a:p>
+            <a:fld id="{0079CAC6-A72B-4EF8-B465-34FA47827E7F}" type="slidenum">
+              <a:rPr lang="en-US" smtClean="0"/>
+              <a:t>30</a:t>
+            </a:fld>
+            <a:endParaRPr lang="en-US" dirty="0"/>
+          </a:p>
+        </p:txBody>
+      </p:sp>
+      <p:pic>
+        <p:nvPicPr>
+          <p:cNvPr id="9" name="Content Placeholder 8">
+            <a:extLst>
+              <a:ext uri="{FF2B5EF4-FFF2-40B4-BE49-F238E27FC236}">
+                <a16:creationId xmlns:a16="http://schemas.microsoft.com/office/drawing/2014/main" id="{45310F2C-0B27-510E-9E9D-173C93035CA4}"/>
+              </a:ext>
+            </a:extLst>
+          </p:cNvPr>
+          <p:cNvPicPr>
+            <a:picLocks noGrp="1" noChangeAspect="1"/>
+          </p:cNvPicPr>
+          <p:nvPr>
+            <p:ph idx="1"/>
+          </p:nvPr>
+        </p:nvPicPr>
+        <p:blipFill>
+          <a:blip r:embed="rId2"/>
+          <a:stretch>
+            <a:fillRect/>
+          </a:stretch>
+        </p:blipFill>
+        <p:spPr bwMode="auto">
+          <a:xfrm>
+            <a:off x="7801232" y="2011680"/>
+            <a:ext cx="2977173" cy="4206875"/>
+          </a:xfrm>
+          <a:prstGeom prst="rect">
+            <a:avLst/>
+          </a:prstGeom>
+          <a:noFill/>
+          <a:extLst>
+            <a:ext uri="{909E8E84-426E-40DD-AFC4-6F175D3DCCD1}">
+              <a14:hiddenFill xmlns:a14="http://schemas.microsoft.com/office/drawing/2010/main">
+                <a:solidFill>
+                  <a:srgbClr val="FFFFFF"/>
+                </a:solidFill>
+              </a14:hiddenFill>
+            </a:ext>
+          </a:extLst>
+        </p:spPr>
+      </p:pic>
+      <p:sp>
+        <p:nvSpPr>
+          <p:cNvPr id="10" name="Content Placeholder 2">
+            <a:extLst>
+              <a:ext uri="{FF2B5EF4-FFF2-40B4-BE49-F238E27FC236}">
+                <a16:creationId xmlns:a16="http://schemas.microsoft.com/office/drawing/2014/main" id="{A4DAA886-CF13-F24E-BC1D-8C9B12FBF111}"/>
+              </a:ext>
+            </a:extLst>
+          </p:cNvPr>
+          <p:cNvSpPr txBox="1">
+            <a:spLocks/>
+          </p:cNvSpPr>
+          <p:nvPr/>
+        </p:nvSpPr>
+        <p:spPr>
+          <a:xfrm>
+            <a:off x="1202919" y="2011680"/>
+            <a:ext cx="9784080" cy="4206240"/>
+          </a:xfrm>
+          <a:prstGeom prst="rect">
+            <a:avLst/>
+          </a:prstGeom>
+        </p:spPr>
+        <p:txBody>
+          <a:bodyPr vert="horz" lIns="91440" tIns="45720" rIns="91440" bIns="45720" rtlCol="0">
+            <a:normAutofit/>
+          </a:bodyPr>
+          <a:lstStyle>
+            <a:lvl1pPr marL="182880" indent="-182880" algn="l" defTabSz="914400" rtl="0" eaLnBrk="1" latinLnBrk="0" hangingPunct="1">
+              <a:lnSpc>
+                <a:spcPct val="90000"/>
+              </a:lnSpc>
+              <a:spcBef>
+                <a:spcPts val="1200"/>
+              </a:spcBef>
+              <a:spcAft>
+                <a:spcPts val="200"/>
+              </a:spcAft>
+              <a:buClr>
+                <a:schemeClr val="tx1"/>
+              </a:buClr>
+              <a:buFont typeface="Wingdings" pitchFamily="2" charset="2"/>
+              <a:buChar char=""/>
+              <a:defRPr sz="3200" kern="1200">
+                <a:solidFill>
+                  <a:schemeClr val="tx1"/>
+                </a:solidFill>
+                <a:latin typeface="+mn-lt"/>
+                <a:ea typeface="+mn-ea"/>
+                <a:cs typeface="+mn-cs"/>
+              </a:defRPr>
+            </a:lvl1pPr>
+            <a:lvl2pPr marL="411480" indent="-182880" algn="l" defTabSz="914400" rtl="0" eaLnBrk="1" latinLnBrk="0" hangingPunct="1">
+              <a:lnSpc>
+                <a:spcPct val="90000"/>
+              </a:lnSpc>
+              <a:spcBef>
+                <a:spcPts val="200"/>
+              </a:spcBef>
+              <a:spcAft>
+                <a:spcPts val="400"/>
+              </a:spcAft>
+              <a:buClr>
+                <a:schemeClr val="tx1"/>
+              </a:buClr>
+              <a:buFont typeface="Wingdings" pitchFamily="2" charset="2"/>
+              <a:buChar char=""/>
+              <a:defRPr sz="3200" kern="1200">
+                <a:solidFill>
+                  <a:schemeClr val="tx1"/>
+                </a:solidFill>
+                <a:latin typeface="+mn-lt"/>
+                <a:ea typeface="+mn-ea"/>
+                <a:cs typeface="+mn-cs"/>
+              </a:defRPr>
+            </a:lvl2pPr>
+            <a:lvl3pPr marL="640080" indent="-182880" algn="l" defTabSz="914400" rtl="0" eaLnBrk="1" latinLnBrk="0" hangingPunct="1">
+              <a:lnSpc>
+                <a:spcPct val="90000"/>
+              </a:lnSpc>
+              <a:spcBef>
+                <a:spcPts val="200"/>
+              </a:spcBef>
+              <a:spcAft>
+                <a:spcPts val="400"/>
+              </a:spcAft>
+              <a:buClr>
+                <a:schemeClr val="tx1"/>
+              </a:buClr>
+              <a:buFont typeface="Wingdings" pitchFamily="2" charset="2"/>
+              <a:buChar char=""/>
+              <a:defRPr sz="2800" kern="1200">
+                <a:solidFill>
+                  <a:schemeClr val="tx1"/>
+                </a:solidFill>
+                <a:latin typeface="+mn-lt"/>
+                <a:ea typeface="+mn-ea"/>
+                <a:cs typeface="+mn-cs"/>
+              </a:defRPr>
+            </a:lvl3pPr>
+            <a:lvl4pPr marL="868680" indent="-182880" algn="l" defTabSz="914400" rtl="0" eaLnBrk="1" latinLnBrk="0" hangingPunct="1">
+              <a:lnSpc>
+                <a:spcPct val="90000"/>
+              </a:lnSpc>
+              <a:spcBef>
+                <a:spcPts val="200"/>
+              </a:spcBef>
+              <a:spcAft>
+                <a:spcPts val="400"/>
+              </a:spcAft>
+              <a:buClr>
+                <a:schemeClr val="tx1"/>
+              </a:buClr>
+              <a:buFont typeface="Wingdings" pitchFamily="2" charset="2"/>
+              <a:buChar char=""/>
+              <a:defRPr sz="2400" kern="1200">
+                <a:solidFill>
+                  <a:schemeClr val="tx1"/>
+                </a:solidFill>
+                <a:latin typeface="+mn-lt"/>
+                <a:ea typeface="+mn-ea"/>
+                <a:cs typeface="+mn-cs"/>
+              </a:defRPr>
+            </a:lvl4pPr>
+            <a:lvl5pPr marL="1097280" indent="-182880" algn="l" defTabSz="914400" rtl="0" eaLnBrk="1" latinLnBrk="0" hangingPunct="1">
+              <a:lnSpc>
+                <a:spcPct val="90000"/>
+              </a:lnSpc>
+              <a:spcBef>
+                <a:spcPts val="200"/>
+              </a:spcBef>
+              <a:spcAft>
+                <a:spcPts val="400"/>
+              </a:spcAft>
+              <a:buClr>
+                <a:schemeClr val="tx1"/>
+              </a:buClr>
+              <a:buFont typeface="Wingdings" pitchFamily="2" charset="2"/>
+              <a:buChar char=""/>
+              <a:defRPr sz="2400" kern="1200">
+                <a:solidFill>
+                  <a:schemeClr val="tx1"/>
+                </a:solidFill>
+                <a:latin typeface="+mn-lt"/>
+                <a:ea typeface="+mn-ea"/>
+                <a:cs typeface="+mn-cs"/>
+              </a:defRPr>
+            </a:lvl5pPr>
+            <a:lvl6pPr marL="1284600" indent="-228600" algn="l" defTabSz="914400" rtl="0" eaLnBrk="1" latinLnBrk="0" hangingPunct="1">
+              <a:lnSpc>
+                <a:spcPct val="90000"/>
+              </a:lnSpc>
+              <a:spcBef>
+                <a:spcPts val="200"/>
+              </a:spcBef>
+              <a:spcAft>
+                <a:spcPts val="400"/>
+              </a:spcAft>
+              <a:buClr>
+                <a:schemeClr val="tx1"/>
+              </a:buClr>
+              <a:buFont typeface="Wingdings" pitchFamily="2" charset="2"/>
+              <a:buChar char=""/>
+              <a:defRPr sz="1600" kern="1200">
+                <a:solidFill>
+                  <a:schemeClr val="tx1"/>
+                </a:solidFill>
+                <a:latin typeface="+mn-lt"/>
+                <a:ea typeface="+mn-ea"/>
+                <a:cs typeface="+mn-cs"/>
+              </a:defRPr>
+            </a:lvl6pPr>
+            <a:lvl7pPr marL="1471800" indent="-228600" algn="l" defTabSz="914400" rtl="0" eaLnBrk="1" latinLnBrk="0" hangingPunct="1">
+              <a:lnSpc>
+                <a:spcPct val="90000"/>
+              </a:lnSpc>
+              <a:spcBef>
+                <a:spcPts val="200"/>
+              </a:spcBef>
+              <a:spcAft>
+                <a:spcPts val="400"/>
+              </a:spcAft>
+              <a:buClr>
+                <a:schemeClr val="tx1"/>
+              </a:buClr>
+              <a:buFont typeface="Wingdings" pitchFamily="2" charset="2"/>
+              <a:buChar char=""/>
+              <a:defRPr sz="1600" kern="1200">
+                <a:solidFill>
+                  <a:schemeClr val="tx1"/>
+                </a:solidFill>
+                <a:latin typeface="+mn-lt"/>
+                <a:ea typeface="+mn-ea"/>
+                <a:cs typeface="+mn-cs"/>
+              </a:defRPr>
+            </a:lvl7pPr>
+            <a:lvl8pPr marL="1629000" indent="-228600" algn="l" defTabSz="914400" rtl="0" eaLnBrk="1" latinLnBrk="0" hangingPunct="1">
+              <a:lnSpc>
+                <a:spcPct val="90000"/>
+              </a:lnSpc>
+              <a:spcBef>
+                <a:spcPts val="200"/>
+              </a:spcBef>
+              <a:spcAft>
+                <a:spcPts val="400"/>
+              </a:spcAft>
+              <a:buClr>
+                <a:schemeClr val="tx1"/>
+              </a:buClr>
+              <a:buFont typeface="Wingdings" pitchFamily="2" charset="2"/>
+              <a:buChar char=""/>
+              <a:defRPr sz="1600" kern="1200">
+                <a:solidFill>
+                  <a:schemeClr val="tx1"/>
+                </a:solidFill>
+                <a:latin typeface="+mn-lt"/>
+                <a:ea typeface="+mn-ea"/>
+                <a:cs typeface="+mn-cs"/>
+              </a:defRPr>
+            </a:lvl8pPr>
+            <a:lvl9pPr marL="1806200" indent="-228600" algn="l" defTabSz="914400" rtl="0" eaLnBrk="1" latinLnBrk="0" hangingPunct="1">
+              <a:lnSpc>
+                <a:spcPct val="90000"/>
+              </a:lnSpc>
+              <a:spcBef>
+                <a:spcPts val="200"/>
+              </a:spcBef>
+              <a:spcAft>
+                <a:spcPts val="400"/>
+              </a:spcAft>
+              <a:buClr>
+                <a:schemeClr val="tx1"/>
+              </a:buClr>
+              <a:buFont typeface="Wingdings" pitchFamily="2" charset="2"/>
+              <a:buChar char=""/>
+              <a:defRPr sz="1600" kern="1200">
+                <a:solidFill>
+                  <a:schemeClr val="tx1"/>
+                </a:solidFill>
+                <a:latin typeface="+mn-lt"/>
+                <a:ea typeface="+mn-ea"/>
+                <a:cs typeface="+mn-cs"/>
+              </a:defRPr>
+            </a:lvl9pPr>
+          </a:lstStyle>
+          <a:p>
+            <a:r>
+              <a:rPr lang="en-US" dirty="0"/>
+              <a:t>Simple statement (+)</a:t>
+            </a:r>
+          </a:p>
+          <a:p>
+            <a:r>
+              <a:rPr lang="en-US" dirty="0"/>
+              <a:t>Loop statement (while)</a:t>
+            </a:r>
+          </a:p>
+          <a:p>
+            <a:r>
+              <a:rPr lang="en-US" dirty="0"/>
+              <a:t>Control statement (if)</a:t>
+            </a:r>
+          </a:p>
+        </p:txBody>
+      </p:sp>
+    </p:spTree>
+    <p:extLst>
+      <p:ext uri="{BB962C8B-B14F-4D97-AF65-F5344CB8AC3E}">
+        <p14:creationId xmlns:p14="http://schemas.microsoft.com/office/powerpoint/2010/main" val="1995445071"/>
+      </p:ext>
+    </p:extLst>
+  </p:cSld>
+  <p:clrMapOvr>
+    <a:masterClrMapping/>
+  </p:clrMapOvr>
+  <p:timing>
+    <p:tnLst>
+      <p:par>
+        <p:cTn id="1" dur="indefinite" restart="never" nodeType="tmRoot">
+          <p:childTnLst>
+            <p:seq concurrent="1" nextAc="seek">
+              <p:cTn id="2" dur="indefinite" nodeType="mainSeq">
+                <p:childTnLst>
+                  <p:par>
+                    <p:cTn id="3" fill="hold">
+                      <p:stCondLst>
+                        <p:cond delay="indefinite"/>
+                      </p:stCondLst>
+                      <p:childTnLst>
+                        <p:par>
+                          <p:cTn id="4" fill="hold">
+                            <p:stCondLst>
+                              <p:cond delay="0"/>
+                            </p:stCondLst>
+                            <p:childTnLst>
+                              <p:par>
+                                <p:cTn id="5" presetID="42" presetClass="entr" presetSubtype="0" fill="hold" nodeType="clickEffect">
+                                  <p:stCondLst>
+                                    <p:cond delay="0"/>
+                                  </p:stCondLst>
+                                  <p:childTnLst>
+                                    <p:set>
+                                      <p:cBhvr>
+                                        <p:cTn id="6" dur="1" fill="hold">
+                                          <p:stCondLst>
+                                            <p:cond delay="0"/>
+                                          </p:stCondLst>
+                                        </p:cTn>
+                                        <p:tgtEl>
+                                          <p:spTgt spid="10">
+                                            <p:txEl>
+                                              <p:pRg st="0" end="0"/>
+                                            </p:txEl>
+                                          </p:spTgt>
+                                        </p:tgtEl>
+                                        <p:attrNameLst>
+                                          <p:attrName>style.visibility</p:attrName>
+                                        </p:attrNameLst>
+                                      </p:cBhvr>
+                                      <p:to>
+                                        <p:strVal val="visible"/>
+                                      </p:to>
+                                    </p:set>
+                                    <p:animEffect transition="in" filter="fade">
+                                      <p:cBhvr>
+                                        <p:cTn id="7" dur="1000"/>
+                                        <p:tgtEl>
+                                          <p:spTgt spid="10">
+                                            <p:txEl>
+                                              <p:pRg st="0" end="0"/>
+                                            </p:txEl>
+                                          </p:spTgt>
+                                        </p:tgtEl>
+                                      </p:cBhvr>
+                                    </p:animEffect>
+                                    <p:anim calcmode="lin" valueType="num">
+                                      <p:cBhvr>
+                                        <p:cTn id="8" dur="1000" fill="hold"/>
+                                        <p:tgtEl>
+                                          <p:spTgt spid="10">
+                                            <p:txEl>
+                                              <p:pRg st="0" end="0"/>
+                                            </p:txEl>
+                                          </p:spTgt>
+                                        </p:tgtEl>
+                                        <p:attrNameLst>
+                                          <p:attrName>ppt_x</p:attrName>
+                                        </p:attrNameLst>
+                                      </p:cBhvr>
+                                      <p:tavLst>
+                                        <p:tav tm="0">
+                                          <p:val>
+                                            <p:strVal val="#ppt_x"/>
+                                          </p:val>
+                                        </p:tav>
+                                        <p:tav tm="100000">
+                                          <p:val>
+                                            <p:strVal val="#ppt_x"/>
+                                          </p:val>
+                                        </p:tav>
+                                      </p:tavLst>
+                                    </p:anim>
+                                    <p:anim calcmode="lin" valueType="num">
+                                      <p:cBhvr>
+                                        <p:cTn id="9" dur="1000" fill="hold"/>
+                                        <p:tgtEl>
+                                          <p:spTgt spid="10">
+                                            <p:txEl>
+                                              <p:pRg st="0" end="0"/>
+                                            </p:txEl>
+                                          </p:spTgt>
+                                        </p:tgtEl>
+                                        <p:attrNameLst>
+                                          <p:attrName>ppt_y</p:attrName>
+                                        </p:attrNameLst>
+                                      </p:cBhvr>
+                                      <p:tavLst>
+                                        <p:tav tm="0">
+                                          <p:val>
+                                            <p:strVal val="#ppt_y+.1"/>
+                                          </p:val>
+                                        </p:tav>
+                                        <p:tav tm="100000">
+                                          <p:val>
+                                            <p:strVal val="#ppt_y"/>
+                                          </p:val>
+                                        </p:tav>
+                                      </p:tavLst>
+                                    </p:anim>
+                                  </p:childTnLst>
+                                </p:cTn>
+                              </p:par>
+                            </p:childTnLst>
+                          </p:cTn>
+                        </p:par>
+                      </p:childTnLst>
+                    </p:cTn>
+                  </p:par>
+                  <p:par>
+                    <p:cTn id="10" fill="hold">
+                      <p:stCondLst>
+                        <p:cond delay="indefinite"/>
+                      </p:stCondLst>
+                      <p:childTnLst>
+                        <p:par>
+                          <p:cTn id="11" fill="hold">
+                            <p:stCondLst>
+                              <p:cond delay="0"/>
+                            </p:stCondLst>
+                            <p:childTnLst>
+                              <p:par>
+                                <p:cTn id="12" presetID="42" presetClass="entr" presetSubtype="0" fill="hold" nodeType="clickEffect">
+                                  <p:stCondLst>
+                                    <p:cond delay="0"/>
+                                  </p:stCondLst>
+                                  <p:childTnLst>
+                                    <p:set>
+                                      <p:cBhvr>
+                                        <p:cTn id="13" dur="1" fill="hold">
+                                          <p:stCondLst>
+                                            <p:cond delay="0"/>
+                                          </p:stCondLst>
+                                        </p:cTn>
+                                        <p:tgtEl>
+                                          <p:spTgt spid="10">
+                                            <p:txEl>
+                                              <p:pRg st="1" end="1"/>
+                                            </p:txEl>
+                                          </p:spTgt>
+                                        </p:tgtEl>
+                                        <p:attrNameLst>
+                                          <p:attrName>style.visibility</p:attrName>
+                                        </p:attrNameLst>
+                                      </p:cBhvr>
+                                      <p:to>
+                                        <p:strVal val="visible"/>
+                                      </p:to>
+                                    </p:set>
+                                    <p:animEffect transition="in" filter="fade">
+                                      <p:cBhvr>
+                                        <p:cTn id="14" dur="1000"/>
+                                        <p:tgtEl>
+                                          <p:spTgt spid="10">
+                                            <p:txEl>
+                                              <p:pRg st="1" end="1"/>
+                                            </p:txEl>
+                                          </p:spTgt>
+                                        </p:tgtEl>
+                                      </p:cBhvr>
+                                    </p:animEffect>
+                                    <p:anim calcmode="lin" valueType="num">
+                                      <p:cBhvr>
+                                        <p:cTn id="15" dur="1000" fill="hold"/>
+                                        <p:tgtEl>
+                                          <p:spTgt spid="10">
+                                            <p:txEl>
+                                              <p:pRg st="1" end="1"/>
+                                            </p:txEl>
+                                          </p:spTgt>
+                                        </p:tgtEl>
+                                        <p:attrNameLst>
+                                          <p:attrName>ppt_x</p:attrName>
+                                        </p:attrNameLst>
+                                      </p:cBhvr>
+                                      <p:tavLst>
+                                        <p:tav tm="0">
+                                          <p:val>
+                                            <p:strVal val="#ppt_x"/>
+                                          </p:val>
+                                        </p:tav>
+                                        <p:tav tm="100000">
+                                          <p:val>
+                                            <p:strVal val="#ppt_x"/>
+                                          </p:val>
+                                        </p:tav>
+                                      </p:tavLst>
+                                    </p:anim>
+                                    <p:anim calcmode="lin" valueType="num">
+                                      <p:cBhvr>
+                                        <p:cTn id="16" dur="1000" fill="hold"/>
+                                        <p:tgtEl>
+                                          <p:spTgt spid="10">
+                                            <p:txEl>
+                                              <p:pRg st="1" end="1"/>
+                                            </p:txEl>
+                                          </p:spTgt>
+                                        </p:tgtEl>
+                                        <p:attrNameLst>
+                                          <p:attrName>ppt_y</p:attrName>
+                                        </p:attrNameLst>
+                                      </p:cBhvr>
+                                      <p:tavLst>
+                                        <p:tav tm="0">
+                                          <p:val>
+                                            <p:strVal val="#ppt_y+.1"/>
+                                          </p:val>
+                                        </p:tav>
+                                        <p:tav tm="100000">
+                                          <p:val>
+                                            <p:strVal val="#ppt_y"/>
+                                          </p:val>
+                                        </p:tav>
+                                      </p:tavLst>
+                                    </p:anim>
+                                  </p:childTnLst>
+                                </p:cTn>
+                              </p:par>
+                            </p:childTnLst>
+                          </p:cTn>
+                        </p:par>
+                      </p:childTnLst>
+                    </p:cTn>
+                  </p:par>
+                  <p:par>
+                    <p:cTn id="17" fill="hold">
+                      <p:stCondLst>
+                        <p:cond delay="indefinite"/>
+                      </p:stCondLst>
+                      <p:childTnLst>
+                        <p:par>
+                          <p:cTn id="18" fill="hold">
+                            <p:stCondLst>
+                              <p:cond delay="0"/>
+                            </p:stCondLst>
+                            <p:childTnLst>
+                              <p:par>
+                                <p:cTn id="19" presetID="42" presetClass="entr" presetSubtype="0" fill="hold" nodeType="clickEffect">
+                                  <p:stCondLst>
+                                    <p:cond delay="0"/>
+                                  </p:stCondLst>
+                                  <p:childTnLst>
+                                    <p:set>
+                                      <p:cBhvr>
+                                        <p:cTn id="20" dur="1" fill="hold">
+                                          <p:stCondLst>
+                                            <p:cond delay="0"/>
+                                          </p:stCondLst>
+                                        </p:cTn>
+                                        <p:tgtEl>
+                                          <p:spTgt spid="10">
+                                            <p:txEl>
+                                              <p:pRg st="2" end="2"/>
+                                            </p:txEl>
+                                          </p:spTgt>
+                                        </p:tgtEl>
+                                        <p:attrNameLst>
+                                          <p:attrName>style.visibility</p:attrName>
+                                        </p:attrNameLst>
+                                      </p:cBhvr>
+                                      <p:to>
+                                        <p:strVal val="visible"/>
+                                      </p:to>
+                                    </p:set>
+                                    <p:animEffect transition="in" filter="fade">
+                                      <p:cBhvr>
+                                        <p:cTn id="21" dur="1000"/>
+                                        <p:tgtEl>
+                                          <p:spTgt spid="10">
+                                            <p:txEl>
+                                              <p:pRg st="2" end="2"/>
+                                            </p:txEl>
+                                          </p:spTgt>
+                                        </p:tgtEl>
+                                      </p:cBhvr>
+                                    </p:animEffect>
+                                    <p:anim calcmode="lin" valueType="num">
+                                      <p:cBhvr>
+                                        <p:cTn id="22" dur="1000" fill="hold"/>
+                                        <p:tgtEl>
+                                          <p:spTgt spid="10">
+                                            <p:txEl>
+                                              <p:pRg st="2" end="2"/>
+                                            </p:txEl>
+                                          </p:spTgt>
+                                        </p:tgtEl>
+                                        <p:attrNameLst>
+                                          <p:attrName>ppt_x</p:attrName>
+                                        </p:attrNameLst>
+                                      </p:cBhvr>
+                                      <p:tavLst>
+                                        <p:tav tm="0">
+                                          <p:val>
+                                            <p:strVal val="#ppt_x"/>
+                                          </p:val>
+                                        </p:tav>
+                                        <p:tav tm="100000">
+                                          <p:val>
+                                            <p:strVal val="#ppt_x"/>
+                                          </p:val>
+                                        </p:tav>
+                                      </p:tavLst>
+                                    </p:anim>
+                                    <p:anim calcmode="lin" valueType="num">
+                                      <p:cBhvr>
+                                        <p:cTn id="23" dur="1000" fill="hold"/>
+                                        <p:tgtEl>
+                                          <p:spTgt spid="10">
+                                            <p:txEl>
+                                              <p:pRg st="2" end="2"/>
+                                            </p:txEl>
+                                          </p:spTgt>
+                                        </p:tgtEl>
+                                        <p:attrNameLst>
+                                          <p:attrName>ppt_y</p:attrName>
+                                        </p:attrNameLst>
+                                      </p:cBhvr>
+                                      <p:tavLst>
+                                        <p:tav tm="0">
+                                          <p:val>
+                                            <p:strVal val="#ppt_y+.1"/>
+                                          </p:val>
+                                        </p:tav>
+                                        <p:tav tm="100000">
+                                          <p:val>
+                                            <p:strVal val="#ppt_y"/>
+                                          </p:val>
+                                        </p:tav>
+                                      </p:tavLst>
+                                    </p:anim>
+                                  </p:childTnLst>
+                                </p:cTn>
+                              </p:par>
+                            </p:childTnLst>
+                          </p:cTn>
+                        </p:par>
+                      </p:childTnLst>
+                    </p:cTn>
+                  </p:par>
+                </p:childTnLst>
+              </p:cTn>
+              <p:prevCondLst>
+                <p:cond evt="onPrev" delay="0">
+                  <p:tgtEl>
+                    <p:sldTgt/>
+                  </p:tgtEl>
+                </p:cond>
+              </p:prevCondLst>
+              <p:nextCondLst>
+                <p:cond evt="onNext" delay="0">
+                  <p:tgtEl>
+                    <p:sldTgt/>
+                  </p:tgtEl>
+                </p:cond>
+              </p:nextCondLst>
+            </p:seq>
+          </p:childTnLst>
+        </p:cTn>
+      </p:par>
+    </p:tnLst>
+  </p:timing>
+</p:sld>
+</file>
+
+<file path=ppt/slides/slide31.xml><?xml version="1.0" encoding="utf-8"?>
+<p:sld xmlns:a="http://schemas.openxmlformats.org/drawingml/2006/main" xmlns:r="http://schemas.openxmlformats.org/officeDocument/2006/relationships" xmlns:p="http://schemas.openxmlformats.org/presentationml/2006/main">
+  <p:cSld>
+    <p:spTree>
+      <p:nvGrpSpPr>
+        <p:cNvPr id="1" name=""/>
+        <p:cNvGrpSpPr/>
+        <p:nvPr/>
+      </p:nvGrpSpPr>
+      <p:grpSpPr>
+        <a:xfrm>
+          <a:off x="0" y="0"/>
+          <a:ext cx="0" cy="0"/>
+          <a:chOff x="0" y="0"/>
+          <a:chExt cx="0" cy="0"/>
+        </a:xfrm>
+      </p:grpSpPr>
+      <p:sp>
+        <p:nvSpPr>
           <p:cNvPr id="5" name="Title 4">
             <a:extLst>
               <a:ext uri="{FF2B5EF4-FFF2-40B4-BE49-F238E27FC236}">
@@ -21536,7 +21821,7 @@
           <a:p>
             <a:fld id="{0079CAC6-A72B-4EF8-B465-34FA47827E7F}" type="slidenum">
               <a:rPr lang="en-US" smtClean="0"/>
-              <a:t>30</a:t>
+              <a:t>31</a:t>
             </a:fld>
             <a:endParaRPr lang="en-US" dirty="0"/>
           </a:p>
@@ -21584,7 +21869,7 @@
 </p:sld>
 </file>
 
-<file path=ppt/slides/slide31.xml><?xml version="1.0" encoding="utf-8"?>
+<file path=ppt/slides/slide32.xml><?xml version="1.0" encoding="utf-8"?>
 <p:sld xmlns:a="http://schemas.openxmlformats.org/drawingml/2006/main" xmlns:r="http://schemas.openxmlformats.org/officeDocument/2006/relationships" xmlns:p="http://schemas.openxmlformats.org/presentationml/2006/main">
   <p:cSld>
     <p:spTree>
@@ -21711,7 +21996,7 @@
           <a:p>
             <a:fld id="{0079CAC6-A72B-4EF8-B465-34FA47827E7F}" type="slidenum">
               <a:rPr lang="en-US" smtClean="0"/>
-              <a:t>31</a:t>
+              <a:t>32</a:t>
             </a:fld>
             <a:endParaRPr lang="en-US" dirty="0"/>
           </a:p>
@@ -21875,7 +22160,7 @@
 </p:sld>
 </file>
 
-<file path=ppt/slides/slide32.xml><?xml version="1.0" encoding="utf-8"?>
+<file path=ppt/slides/slide33.xml><?xml version="1.0" encoding="utf-8"?>
 <p:sld xmlns:a="http://schemas.openxmlformats.org/drawingml/2006/main" xmlns:r="http://schemas.openxmlformats.org/officeDocument/2006/relationships" xmlns:p="http://schemas.openxmlformats.org/presentationml/2006/main">
   <p:cSld>
     <p:spTree>
@@ -22067,7 +22352,7 @@
           <a:p>
             <a:fld id="{0079CAC6-A72B-4EF8-B465-34FA47827E7F}" type="slidenum">
               <a:rPr lang="en-US" smtClean="0"/>
-              <a:t>32</a:t>
+              <a:t>33</a:t>
             </a:fld>
             <a:endParaRPr lang="en-US" dirty="0"/>
           </a:p>
@@ -22665,7 +22950,7 @@
 </p:sld>
 </file>
 
-<file path=ppt/slides/slide33.xml><?xml version="1.0" encoding="utf-8"?>
+<file path=ppt/slides/slide34.xml><?xml version="1.0" encoding="utf-8"?>
 <p:sld xmlns:a="http://schemas.openxmlformats.org/drawingml/2006/main" xmlns:r="http://schemas.openxmlformats.org/officeDocument/2006/relationships" xmlns:p="http://schemas.openxmlformats.org/presentationml/2006/main">
   <p:cSld>
     <p:spTree>
@@ -22802,7 +23087,7 @@
           <a:p>
             <a:fld id="{0079CAC6-A72B-4EF8-B465-34FA47827E7F}" type="slidenum">
               <a:rPr lang="en-US" smtClean="0"/>
-              <a:t>33</a:t>
+              <a:t>34</a:t>
             </a:fld>
             <a:endParaRPr lang="en-US" dirty="0"/>
           </a:p>
@@ -22868,7 +23153,7 @@
 </p:sld>
 </file>
 
-<file path=ppt/slides/slide34.xml><?xml version="1.0" encoding="utf-8"?>
+<file path=ppt/slides/slide35.xml><?xml version="1.0" encoding="utf-8"?>
 <p:sld xmlns:a="http://schemas.openxmlformats.org/drawingml/2006/main" xmlns:r="http://schemas.openxmlformats.org/officeDocument/2006/relationships" xmlns:p="http://schemas.openxmlformats.org/presentationml/2006/main">
   <p:cSld>
     <p:spTree>
@@ -22937,7 +23222,7 @@
           <a:p>
             <a:fld id="{0079CAC6-A72B-4EF8-B465-34FA47827E7F}" type="slidenum">
               <a:rPr lang="en-US" smtClean="0"/>
-              <a:t>34</a:t>
+              <a:t>35</a:t>
             </a:fld>
             <a:endParaRPr lang="en-US" dirty="0"/>
           </a:p>
@@ -22985,7 +23270,7 @@
 </p:sld>
 </file>
 
-<file path=ppt/slides/slide35.xml><?xml version="1.0" encoding="utf-8"?>
+<file path=ppt/slides/slide36.xml><?xml version="1.0" encoding="utf-8"?>
 <p:sld xmlns:a="http://schemas.openxmlformats.org/drawingml/2006/main" xmlns:r="http://schemas.openxmlformats.org/officeDocument/2006/relationships" xmlns:p="http://schemas.openxmlformats.org/presentationml/2006/main">
   <p:cSld>
     <p:spTree>
@@ -23082,7 +23367,7 @@
           <a:p>
             <a:fld id="{0079CAC6-A72B-4EF8-B465-34FA47827E7F}" type="slidenum">
               <a:rPr lang="en-US" smtClean="0"/>
-              <a:t>35</a:t>
+              <a:t>36</a:t>
             </a:fld>
             <a:endParaRPr lang="en-US" dirty="0"/>
           </a:p>
@@ -23156,7 +23441,7 @@
 </p:sld>
 </file>
 
-<file path=ppt/slides/slide36.xml><?xml version="1.0" encoding="utf-8"?>
+<file path=ppt/slides/slide37.xml><?xml version="1.0" encoding="utf-8"?>
 <p:sld xmlns:a="http://schemas.openxmlformats.org/drawingml/2006/main" xmlns:r="http://schemas.openxmlformats.org/officeDocument/2006/relationships" xmlns:p="http://schemas.openxmlformats.org/presentationml/2006/main">
   <p:cSld>
     <p:spTree>
@@ -23282,7 +23567,7 @@
           <a:p>
             <a:fld id="{0079CAC6-A72B-4EF8-B465-34FA47827E7F}" type="slidenum">
               <a:rPr lang="en-US" smtClean="0"/>
-              <a:t>36</a:t>
+              <a:t>37</a:t>
             </a:fld>
             <a:endParaRPr lang="en-US" dirty="0"/>
           </a:p>
@@ -23301,7 +23586,7 @@
 </p:sld>
 </file>
 
-<file path=ppt/slides/slide37.xml><?xml version="1.0" encoding="utf-8"?>
+<file path=ppt/slides/slide38.xml><?xml version="1.0" encoding="utf-8"?>
 <p:sld xmlns:a="http://schemas.openxmlformats.org/drawingml/2006/main" xmlns:r="http://schemas.openxmlformats.org/officeDocument/2006/relationships" xmlns:p="http://schemas.openxmlformats.org/presentationml/2006/main">
   <p:cSld>
     <p:spTree>
@@ -23423,7 +23708,7 @@
           <a:p>
             <a:fld id="{0079CAC6-A72B-4EF8-B465-34FA47827E7F}" type="slidenum">
               <a:rPr lang="en-US" smtClean="0"/>
-              <a:t>37</a:t>
+              <a:t>38</a:t>
             </a:fld>
             <a:endParaRPr lang="en-US" dirty="0"/>
           </a:p>
@@ -23472,7 +23757,7 @@
 </p:sld>
 </file>
 
-<file path=ppt/slides/slide38.xml><?xml version="1.0" encoding="utf-8"?>
+<file path=ppt/slides/slide39.xml><?xml version="1.0" encoding="utf-8"?>
 <p:sld xmlns:a="http://schemas.openxmlformats.org/drawingml/2006/main" xmlns:r="http://schemas.openxmlformats.org/officeDocument/2006/relationships" xmlns:p="http://schemas.openxmlformats.org/presentationml/2006/main">
   <p:cSld>
     <p:spTree>
@@ -23606,7 +23891,7 @@
           <a:p>
             <a:fld id="{0079CAC6-A72B-4EF8-B465-34FA47827E7F}" type="slidenum">
               <a:rPr lang="en-US" smtClean="0"/>
-              <a:t>38</a:t>
+              <a:t>39</a:t>
             </a:fld>
             <a:endParaRPr lang="en-US" dirty="0"/>
           </a:p>

</xml_diff>